<commit_message>
updated new restroom page
</commit_message>
<xml_diff>
--- a/Calhacks15.pptx
+++ b/Calhacks15.pptx
@@ -3043,7 +3043,7 @@
               <a:t>FindA</a:t>
             </a:r>
             <a:r>
-              <a:rPr lang="en-US" sz="7200" spc="-300" smtClean="0">
+              <a:rPr lang="en-US" sz="7200" spc="-300" dirty="0" smtClean="0">
                 <a:solidFill>
                   <a:schemeClr val="bg1"/>
                 </a:solidFill>
@@ -3587,45 +3587,6 @@
           <a:chExt cx="0" cy="0"/>
         </a:xfrm>
       </p:grpSpPr>
-      <p:pic>
-        <p:nvPicPr>
-          <p:cNvPr id="1026" name="Picture 2" descr="google-maps-main.png (640×1136)"/>
-          <p:cNvPicPr>
-            <a:picLocks noChangeAspect="1" noChangeArrowheads="1"/>
-          </p:cNvPicPr>
-          <p:nvPr/>
-        </p:nvPicPr>
-        <p:blipFill rotWithShape="1">
-          <a:blip r:embed="rId2">
-            <a:extLst>
-              <a:ext uri="{28A0092B-C50C-407E-A947-70E740481C1C}">
-                <a14:useLocalDpi xmlns:a14="http://schemas.microsoft.com/office/drawing/2010/main" val="0"/>
-              </a:ext>
-            </a:extLst>
-          </a:blip>
-          <a:srcRect t="46123" b="4642"/>
-          <a:stretch/>
-        </p:blipFill>
-        <p:spPr bwMode="auto">
-          <a:xfrm>
-            <a:off x="0" y="1589068"/>
-            <a:ext cx="7351713" cy="6424758"/>
-          </a:xfrm>
-          <a:prstGeom prst="rect">
-            <a:avLst/>
-          </a:prstGeom>
-          <a:noFill/>
-          <a:extLst>
-            <a:ext uri="{909E8E84-426E-40DD-AFC4-6F175D3DCCD1}">
-              <a14:hiddenFill xmlns:a14="http://schemas.microsoft.com/office/drawing/2010/main">
-                <a:solidFill>
-                  <a:srgbClr val="FFFFFF"/>
-                </a:solidFill>
-              </a14:hiddenFill>
-            </a:ext>
-          </a:extLst>
-        </p:spPr>
-      </p:pic>
       <p:sp>
         <p:nvSpPr>
           <p:cNvPr id="5" name="Rectangle 4"/>
@@ -3838,7 +3799,7 @@
         </p:nvSpPr>
         <p:spPr>
           <a:xfrm>
-            <a:off x="-1" y="3716300"/>
+            <a:off x="-3" y="1650513"/>
             <a:ext cx="7351712" cy="513044"/>
           </a:xfrm>
           <a:prstGeom prst="rect">
@@ -4078,7 +4039,7 @@
         </p:nvSpPr>
         <p:spPr>
           <a:xfrm>
-            <a:off x="46673" y="3716300"/>
+            <a:off x="9144" y="1650512"/>
             <a:ext cx="3493008" cy="461665"/>
           </a:xfrm>
           <a:prstGeom prst="rect">
@@ -4110,104 +4071,14 @@
       </p:sp>
       <p:sp>
         <p:nvSpPr>
-          <p:cNvPr id="132" name="Teardrop 131"/>
-          <p:cNvSpPr/>
-          <p:nvPr/>
-        </p:nvSpPr>
-        <p:spPr>
-          <a:xfrm rot="8076170">
-            <a:off x="2426073" y="2442579"/>
-            <a:ext cx="372125" cy="355849"/>
-          </a:xfrm>
-          <a:prstGeom prst="teardrop">
-            <a:avLst>
-              <a:gd name="adj" fmla="val 149987"/>
-            </a:avLst>
-          </a:prstGeom>
-          <a:solidFill>
-            <a:srgbClr val="FF0000"/>
-          </a:solidFill>
-          <a:ln>
-            <a:noFill/>
-          </a:ln>
-        </p:spPr>
-        <p:style>
-          <a:lnRef idx="2">
-            <a:schemeClr val="accent1">
-              <a:shade val="50000"/>
-            </a:schemeClr>
-          </a:lnRef>
-          <a:fillRef idx="1">
-            <a:schemeClr val="accent1"/>
-          </a:fillRef>
-          <a:effectRef idx="0">
-            <a:schemeClr val="accent1"/>
-          </a:effectRef>
-          <a:fontRef idx="minor">
-            <a:schemeClr val="lt1"/>
-          </a:fontRef>
-        </p:style>
-        <p:txBody>
-          <a:bodyPr rtlCol="0" anchor="ctr"/>
-          <a:lstStyle/>
-          <a:p>
-            <a:pPr algn="ctr"/>
-            <a:endParaRPr lang="en-US" dirty="0">
-              <a:solidFill>
-                <a:srgbClr val="FF0000"/>
-              </a:solidFill>
-            </a:endParaRPr>
-          </a:p>
-        </p:txBody>
-      </p:sp>
-      <p:cxnSp>
-        <p:nvCxnSpPr>
-          <p:cNvPr id="134" name="Straight Connector 133"/>
-          <p:cNvCxnSpPr/>
-          <p:nvPr/>
-        </p:nvCxnSpPr>
-        <p:spPr>
-          <a:xfrm flipV="1">
-            <a:off x="-1" y="4202096"/>
-            <a:ext cx="7351712" cy="19119"/>
-          </a:xfrm>
-          <a:prstGeom prst="line">
-            <a:avLst/>
-          </a:prstGeom>
-          <a:ln w="38100">
-            <a:solidFill>
-              <a:schemeClr val="accent6">
-                <a:lumMod val="60000"/>
-                <a:lumOff val="40000"/>
-              </a:schemeClr>
-            </a:solidFill>
-          </a:ln>
-        </p:spPr>
-        <p:style>
-          <a:lnRef idx="1">
-            <a:schemeClr val="accent1"/>
-          </a:lnRef>
-          <a:fillRef idx="0">
-            <a:schemeClr val="accent1"/>
-          </a:fillRef>
-          <a:effectRef idx="0">
-            <a:schemeClr val="accent1"/>
-          </a:effectRef>
-          <a:fontRef idx="minor">
-            <a:schemeClr val="tx1"/>
-          </a:fontRef>
-        </p:style>
-      </p:cxnSp>
-      <p:sp>
-        <p:nvSpPr>
           <p:cNvPr id="1039" name="Rectangle 1038"/>
           <p:cNvSpPr/>
           <p:nvPr/>
         </p:nvSpPr>
         <p:spPr>
           <a:xfrm>
-            <a:off x="340952" y="9356216"/>
-            <a:ext cx="6669802" cy="1262508"/>
+            <a:off x="340951" y="7880248"/>
+            <a:ext cx="6587463" cy="2738476"/>
           </a:xfrm>
           <a:prstGeom prst="rect">
             <a:avLst/>
@@ -4272,13 +4143,13 @@
           <p:nvPr>
             <p:extLst>
               <p:ext uri="{D42A27DB-BD31-4B8C-83A1-F6EECF244321}">
-                <p14:modId xmlns:p14="http://schemas.microsoft.com/office/powerpoint/2010/main" val="2404036824"/>
+                <p14:modId xmlns:p14="http://schemas.microsoft.com/office/powerpoint/2010/main" val="1854142484"/>
               </p:ext>
             </p:extLst>
           </p:nvPr>
         </p:nvGraphicFramePr>
         <p:xfrm>
-          <a:off x="340953" y="4496762"/>
+          <a:off x="340952" y="2460456"/>
           <a:ext cx="6669801" cy="703149"/>
         </p:xfrm>
         <a:graphic>
@@ -4346,14 +4217,14 @@
           <p:nvPr>
             <p:extLst>
               <p:ext uri="{D42A27DB-BD31-4B8C-83A1-F6EECF244321}">
-                <p14:modId xmlns:p14="http://schemas.microsoft.com/office/powerpoint/2010/main" val="4199911481"/>
+                <p14:modId xmlns:p14="http://schemas.microsoft.com/office/powerpoint/2010/main" val="4194146251"/>
               </p:ext>
             </p:extLst>
           </p:nvPr>
         </p:nvGraphicFramePr>
         <p:xfrm>
-          <a:off x="340952" y="5482810"/>
-          <a:ext cx="6669802" cy="3873405"/>
+          <a:off x="340952" y="3407018"/>
+          <a:ext cx="6745735" cy="4473230"/>
         </p:xfrm>
         <a:graphic>
           <a:graphicData uri="http://schemas.openxmlformats.org/drawingml/2006/table">
@@ -4362,9 +4233,9 @@
                 <a:tableStyleId>{2D5ABB26-0587-4C30-8999-92F81FD0307C}</a:tableStyleId>
               </a:tblPr>
               <a:tblGrid>
-                <a:gridCol w="6669802"/>
+                <a:gridCol w="6745735"/>
               </a:tblGrid>
-              <a:tr h="774681">
+              <a:tr h="894646">
                 <a:tc>
                   <a:txBody>
                     <a:bodyPr/>
@@ -4392,7 +4263,7 @@
                   <a:tcPr/>
                 </a:tc>
               </a:tr>
-              <a:tr h="774681">
+              <a:tr h="894646">
                 <a:tc>
                   <a:txBody>
                     <a:bodyPr/>
@@ -4420,7 +4291,7 @@
                   <a:tcPr/>
                 </a:tc>
               </a:tr>
-              <a:tr h="774681">
+              <a:tr h="894646">
                 <a:tc>
                   <a:txBody>
                     <a:bodyPr/>
@@ -4448,7 +4319,7 @@
                   <a:tcPr/>
                 </a:tc>
               </a:tr>
-              <a:tr h="774681">
+              <a:tr h="894646">
                 <a:tc>
                   <a:txBody>
                     <a:bodyPr/>
@@ -4476,7 +4347,7 @@
                   <a:tcPr/>
                 </a:tc>
               </a:tr>
-              <a:tr h="774681">
+              <a:tr h="894646">
                 <a:tc>
                   <a:txBody>
                     <a:bodyPr/>
@@ -4526,7 +4397,7 @@
         </p:nvSpPr>
         <p:spPr>
           <a:xfrm>
-            <a:off x="3075926" y="5474694"/>
+            <a:off x="3075925" y="3438388"/>
             <a:ext cx="1766287" cy="512166"/>
           </a:xfrm>
           <a:prstGeom prst="roundRect">
@@ -4579,7 +4450,7 @@
         </p:nvSpPr>
         <p:spPr>
           <a:xfrm>
-            <a:off x="3075925" y="6239152"/>
+            <a:off x="3075925" y="4336497"/>
             <a:ext cx="1766287" cy="512166"/>
           </a:xfrm>
           <a:prstGeom prst="roundRect">
@@ -4632,7 +4503,7 @@
         </p:nvSpPr>
         <p:spPr>
           <a:xfrm>
-            <a:off x="5162129" y="5474681"/>
+            <a:off x="5162128" y="3438375"/>
             <a:ext cx="1766287" cy="512166"/>
           </a:xfrm>
           <a:prstGeom prst="roundRect">
@@ -4699,7 +4570,7 @@
         </p:nvSpPr>
         <p:spPr>
           <a:xfrm>
-            <a:off x="5162129" y="6239152"/>
+            <a:off x="5162129" y="4336497"/>
             <a:ext cx="1766287" cy="512166"/>
           </a:xfrm>
           <a:prstGeom prst="roundRect">
@@ -4766,7 +4637,7 @@
         </p:nvSpPr>
         <p:spPr>
           <a:xfrm>
-            <a:off x="3159839" y="8617689"/>
+            <a:off x="3262251" y="6884640"/>
             <a:ext cx="533367" cy="517483"/>
           </a:xfrm>
           <a:prstGeom prst="star5">
@@ -4815,7 +4686,7 @@
         </p:nvSpPr>
         <p:spPr>
           <a:xfrm>
-            <a:off x="3886111" y="8612122"/>
+            <a:off x="3988523" y="6879073"/>
             <a:ext cx="533367" cy="517483"/>
           </a:xfrm>
           <a:prstGeom prst="star5">
@@ -4864,7 +4735,7 @@
         </p:nvSpPr>
         <p:spPr>
           <a:xfrm>
-            <a:off x="4628762" y="8599899"/>
+            <a:off x="4731174" y="6866850"/>
             <a:ext cx="533367" cy="517483"/>
           </a:xfrm>
           <a:prstGeom prst="star5">
@@ -4913,7 +4784,7 @@
         </p:nvSpPr>
         <p:spPr>
           <a:xfrm>
-            <a:off x="5355095" y="8612122"/>
+            <a:off x="5457507" y="6879073"/>
             <a:ext cx="533367" cy="517483"/>
           </a:xfrm>
           <a:prstGeom prst="star5">
@@ -4962,7 +4833,7 @@
         </p:nvSpPr>
         <p:spPr>
           <a:xfrm>
-            <a:off x="6080457" y="8612122"/>
+            <a:off x="6182869" y="6879073"/>
             <a:ext cx="533367" cy="517483"/>
           </a:xfrm>
           <a:prstGeom prst="star5">

</xml_diff>

<commit_message>
updated new RR again
</commit_message>
<xml_diff>
--- a/Calhacks15.pptx
+++ b/Calhacks15.pptx
@@ -4637,7 +4637,7 @@
         </p:nvSpPr>
         <p:spPr>
           <a:xfrm>
-            <a:off x="3262251" y="6884640"/>
+            <a:off x="3075925" y="6987693"/>
             <a:ext cx="533367" cy="517483"/>
           </a:xfrm>
           <a:prstGeom prst="star5">
@@ -4686,7 +4686,7 @@
         </p:nvSpPr>
         <p:spPr>
           <a:xfrm>
-            <a:off x="3988523" y="6879073"/>
+            <a:off x="3802197" y="6982126"/>
             <a:ext cx="533367" cy="517483"/>
           </a:xfrm>
           <a:prstGeom prst="star5">
@@ -4735,7 +4735,7 @@
         </p:nvSpPr>
         <p:spPr>
           <a:xfrm>
-            <a:off x="4731174" y="6866850"/>
+            <a:off x="4544848" y="6969903"/>
             <a:ext cx="533367" cy="517483"/>
           </a:xfrm>
           <a:prstGeom prst="star5">
@@ -4784,7 +4784,7 @@
         </p:nvSpPr>
         <p:spPr>
           <a:xfrm>
-            <a:off x="5457507" y="6879073"/>
+            <a:off x="5271181" y="6982126"/>
             <a:ext cx="533367" cy="517483"/>
           </a:xfrm>
           <a:prstGeom prst="star5">
@@ -4833,7 +4833,7 @@
         </p:nvSpPr>
         <p:spPr>
           <a:xfrm>
-            <a:off x="6182869" y="6879073"/>
+            <a:off x="5996543" y="6982126"/>
             <a:ext cx="533367" cy="517483"/>
           </a:xfrm>
           <a:prstGeom prst="star5">

</xml_diff>